<commit_message>
Added pdf, cleaned up powerpoint
</commit_message>
<xml_diff>
--- a/0-Workshop/Intro_to_GitHub_and_Version_Control.pptx
+++ b/0-Workshop/Intro_to_GitHub_and_Version_Control.pptx
@@ -5,10 +5,10 @@
     <p:sldMasterId id="2147483672" r:id="rId4"/>
   </p:sldMasterIdLst>
   <p:notesMasterIdLst>
-    <p:notesMasterId r:id="rId24"/>
+    <p:notesMasterId r:id="rId25"/>
   </p:notesMasterIdLst>
   <p:handoutMasterIdLst>
-    <p:handoutMasterId r:id="rId25"/>
+    <p:handoutMasterId r:id="rId26"/>
   </p:handoutMasterIdLst>
   <p:sldIdLst>
     <p:sldId id="322" r:id="rId5"/>
@@ -27,14 +27,15 @@
     <p:sldId id="333" r:id="rId18"/>
     <p:sldId id="338" r:id="rId19"/>
     <p:sldId id="337" r:id="rId20"/>
-    <p:sldId id="325" r:id="rId21"/>
-    <p:sldId id="356" r:id="rId22"/>
-    <p:sldId id="353" r:id="rId23"/>
+    <p:sldId id="357" r:id="rId21"/>
+    <p:sldId id="325" r:id="rId22"/>
+    <p:sldId id="356" r:id="rId23"/>
+    <p:sldId id="353" r:id="rId24"/>
   </p:sldIdLst>
   <p:sldSz cx="12188825" cy="6858000"/>
   <p:notesSz cx="6858000" cy="9144000"/>
   <p:custDataLst>
-    <p:tags r:id="rId26"/>
+    <p:tags r:id="rId27"/>
   </p:custDataLst>
   <p:defaultTextStyle>
     <a:defPPr>
@@ -325,7 +326,7 @@
           <a:p>
             <a:fld id="{59088EAF-6ECA-4616-85EF-35AA19C641F3}" type="datetimeFigureOut">
               <a:rPr lang="en-US"/>
-              <a:t>10/17/2018</a:t>
+              <a:t>10/18/2018</a:t>
             </a:fld>
             <a:endParaRPr dirty="0"/>
           </a:p>
@@ -490,7 +491,7 @@
           <a:p>
             <a:fld id="{3ABD2D7A-D230-4F91-BD59-0A39C2703BA8}" type="datetimeFigureOut">
               <a:rPr lang="en-US"/>
-              <a:t>10/17/2018</a:t>
+              <a:t>10/18/2018</a:t>
             </a:fld>
             <a:endParaRPr dirty="0"/>
           </a:p>
@@ -1442,7 +1443,7 @@
           <a:p>
             <a:fld id="{F93199CD-3E1B-4AE6-990F-76F925F5EA9F}" type="slidenum">
               <a:rPr lang="en-US" smtClean="0"/>
-              <a:t>17</a:t>
+              <a:t>18</a:t>
             </a:fld>
             <a:endParaRPr lang="en-US" dirty="0"/>
           </a:p>
@@ -1681,7 +1682,7 @@
           <a:p>
             <a:fld id="{D3CF1DD8-EA54-4310-AED7-E3C8DF021AB2}" type="datetime1">
               <a:rPr lang="en-US" smtClean="0"/>
-              <a:t>10/17/2018</a:t>
+              <a:t>10/18/2018</a:t>
             </a:fld>
             <a:endParaRPr lang="en-US" dirty="0"/>
           </a:p>
@@ -1897,7 +1898,7 @@
           <a:p>
             <a:fld id="{190E05DA-EDBC-488B-8F5F-E4D3B72686DB}" type="datetime1">
               <a:rPr lang="en-US" smtClean="0"/>
-              <a:t>10/17/2018</a:t>
+              <a:t>10/18/2018</a:t>
             </a:fld>
             <a:endParaRPr lang="en-US" dirty="0"/>
           </a:p>
@@ -2092,7 +2093,7 @@
           <a:p>
             <a:fld id="{4C6895F5-2650-4B16-88BA-0497E506F811}" type="datetime1">
               <a:rPr lang="en-US" smtClean="0"/>
-              <a:t>10/17/2018</a:t>
+              <a:t>10/18/2018</a:t>
             </a:fld>
             <a:endParaRPr lang="en-US" dirty="0"/>
           </a:p>
@@ -2284,7 +2285,7 @@
           <a:p>
             <a:fld id="{EEFD959E-6EE8-44BF-B98D-114B166EDF28}" type="datetime1">
               <a:rPr lang="en-US" smtClean="0"/>
-              <a:t>10/17/2018</a:t>
+              <a:t>10/18/2018</a:t>
             </a:fld>
             <a:endParaRPr lang="en-US" dirty="0"/>
           </a:p>
@@ -2555,7 +2556,7 @@
           <a:p>
             <a:fld id="{8AA4DB45-0E03-4AFB-AE7E-9AD4C92AE0B8}" type="datetime1">
               <a:rPr lang="en-US" smtClean="0"/>
-              <a:t>10/17/2018</a:t>
+              <a:t>10/18/2018</a:t>
             </a:fld>
             <a:endParaRPr lang="en-US" dirty="0"/>
           </a:p>
@@ -2867,7 +2868,7 @@
           <a:p>
             <a:fld id="{909E99EE-0B53-4EDD-A7B2-30BD3D624F8B}" type="datetime1">
               <a:rPr lang="en-US" smtClean="0"/>
-              <a:t>10/17/2018</a:t>
+              <a:t>10/18/2018</a:t>
             </a:fld>
             <a:endParaRPr lang="en-US" dirty="0"/>
           </a:p>
@@ -3331,7 +3332,7 @@
           <a:p>
             <a:fld id="{36A6C12A-4231-4622-9899-74B4BF910F92}" type="datetime1">
               <a:rPr lang="en-US" smtClean="0"/>
-              <a:t>10/17/2018</a:t>
+              <a:t>10/18/2018</a:t>
             </a:fld>
             <a:endParaRPr lang="en-US" dirty="0"/>
           </a:p>
@@ -3464,7 +3465,7 @@
           <a:p>
             <a:fld id="{A7D45C95-B26D-483E-838A-6F688B97AA83}" type="datetime1">
               <a:rPr lang="en-US" smtClean="0"/>
-              <a:t>10/17/2018</a:t>
+              <a:t>10/18/2018</a:t>
             </a:fld>
             <a:endParaRPr lang="en-US" dirty="0"/>
           </a:p>
@@ -3574,7 +3575,7 @@
           <a:p>
             <a:fld id="{7D4BA7C8-2BC7-4837-A612-A43C135745D6}" type="datetime1">
               <a:rPr lang="en-US" smtClean="0"/>
-              <a:t>10/17/2018</a:t>
+              <a:t>10/18/2018</a:t>
             </a:fld>
             <a:endParaRPr lang="en-US" dirty="0"/>
           </a:p>
@@ -3885,7 +3886,7 @@
           <a:p>
             <a:fld id="{27DA9B8C-A196-4303-A02B-ADCF846DF698}" type="datetime1">
               <a:rPr lang="en-US" smtClean="0"/>
-              <a:t>10/17/2018</a:t>
+              <a:t>10/18/2018</a:t>
             </a:fld>
             <a:endParaRPr lang="en-US" dirty="0"/>
           </a:p>
@@ -4185,7 +4186,7 @@
           <a:p>
             <a:fld id="{8C43732D-E01D-41A2-85EE-79032A3DB194}" type="datetime1">
               <a:rPr lang="en-US" smtClean="0"/>
-              <a:t>10/17/2018</a:t>
+              <a:t>10/18/2018</a:t>
             </a:fld>
             <a:endParaRPr lang="en-US" dirty="0"/>
           </a:p>
@@ -4444,7 +4445,7 @@
           <a:p>
             <a:fld id="{ACDD0367-F9D6-4728-8986-6F7BEA0CACCF}" type="datetime1">
               <a:rPr lang="en-US" smtClean="0"/>
-              <a:t>10/17/2018</a:t>
+              <a:t>10/18/2018</a:t>
             </a:fld>
             <a:endParaRPr lang="en-US" dirty="0"/>
           </a:p>
@@ -5707,11 +5708,7 @@
           <a:p>
             <a:r>
               <a:rPr lang="en-US" dirty="0" smtClean="0"/>
-              <a:t>Not maintained on our servers (unless we run Enterprise edition</a:t>
-            </a:r>
-            <a:r>
-              <a:rPr lang="en-US" dirty="0" smtClean="0"/>
-              <a:t>)</a:t>
+              <a:t>Not maintained on our servers (unless we run Enterprise edition)</a:t>
             </a:r>
           </a:p>
           <a:p>
@@ -6239,7 +6236,430 @@
   <p:timing>
     <p:tnLst>
       <p:par>
-        <p:cTn id="1" dur="indefinite" restart="never" nodeType="tmRoot"/>
+        <p:cTn id="1" dur="indefinite" restart="never" nodeType="tmRoot">
+          <p:childTnLst>
+            <p:seq concurrent="1" nextAc="seek">
+              <p:cTn id="2" dur="indefinite" nodeType="mainSeq">
+                <p:childTnLst>
+                  <p:par>
+                    <p:cTn id="3" fill="hold">
+                      <p:stCondLst>
+                        <p:cond delay="indefinite"/>
+                      </p:stCondLst>
+                      <p:childTnLst>
+                        <p:par>
+                          <p:cTn id="4" fill="hold">
+                            <p:stCondLst>
+                              <p:cond delay="0"/>
+                            </p:stCondLst>
+                            <p:childTnLst>
+                              <p:par>
+                                <p:cTn id="5" presetID="1" presetClass="entr" presetSubtype="0" fill="hold" nodeType="clickEffect">
+                                  <p:stCondLst>
+                                    <p:cond delay="0"/>
+                                  </p:stCondLst>
+                                  <p:childTnLst>
+                                    <p:set>
+                                      <p:cBhvr>
+                                        <p:cTn id="6" dur="1" fill="hold">
+                                          <p:stCondLst>
+                                            <p:cond delay="0"/>
+                                          </p:stCondLst>
+                                        </p:cTn>
+                                        <p:tgtEl>
+                                          <p:spTgt spid="14">
+                                            <p:txEl>
+                                              <p:pRg st="0" end="0"/>
+                                            </p:txEl>
+                                          </p:spTgt>
+                                        </p:tgtEl>
+                                        <p:attrNameLst>
+                                          <p:attrName>style.visibility</p:attrName>
+                                        </p:attrNameLst>
+                                      </p:cBhvr>
+                                      <p:to>
+                                        <p:strVal val="visible"/>
+                                      </p:to>
+                                    </p:set>
+                                  </p:childTnLst>
+                                </p:cTn>
+                              </p:par>
+                            </p:childTnLst>
+                          </p:cTn>
+                        </p:par>
+                      </p:childTnLst>
+                    </p:cTn>
+                  </p:par>
+                  <p:par>
+                    <p:cTn id="7" fill="hold">
+                      <p:stCondLst>
+                        <p:cond delay="indefinite"/>
+                      </p:stCondLst>
+                      <p:childTnLst>
+                        <p:par>
+                          <p:cTn id="8" fill="hold">
+                            <p:stCondLst>
+                              <p:cond delay="0"/>
+                            </p:stCondLst>
+                            <p:childTnLst>
+                              <p:par>
+                                <p:cTn id="9" presetID="1" presetClass="entr" presetSubtype="0" fill="hold" nodeType="clickEffect">
+                                  <p:stCondLst>
+                                    <p:cond delay="0"/>
+                                  </p:stCondLst>
+                                  <p:childTnLst>
+                                    <p:set>
+                                      <p:cBhvr>
+                                        <p:cTn id="10" dur="1" fill="hold">
+                                          <p:stCondLst>
+                                            <p:cond delay="0"/>
+                                          </p:stCondLst>
+                                        </p:cTn>
+                                        <p:tgtEl>
+                                          <p:spTgt spid="14">
+                                            <p:txEl>
+                                              <p:pRg st="1" end="1"/>
+                                            </p:txEl>
+                                          </p:spTgt>
+                                        </p:tgtEl>
+                                        <p:attrNameLst>
+                                          <p:attrName>style.visibility</p:attrName>
+                                        </p:attrNameLst>
+                                      </p:cBhvr>
+                                      <p:to>
+                                        <p:strVal val="visible"/>
+                                      </p:to>
+                                    </p:set>
+                                  </p:childTnLst>
+                                </p:cTn>
+                              </p:par>
+                              <p:par>
+                                <p:cTn id="11" presetID="1" presetClass="entr" presetSubtype="0" fill="hold" nodeType="withEffect">
+                                  <p:stCondLst>
+                                    <p:cond delay="0"/>
+                                  </p:stCondLst>
+                                  <p:childTnLst>
+                                    <p:set>
+                                      <p:cBhvr>
+                                        <p:cTn id="12" dur="1" fill="hold">
+                                          <p:stCondLst>
+                                            <p:cond delay="0"/>
+                                          </p:stCondLst>
+                                        </p:cTn>
+                                        <p:tgtEl>
+                                          <p:spTgt spid="14">
+                                            <p:txEl>
+                                              <p:pRg st="2" end="2"/>
+                                            </p:txEl>
+                                          </p:spTgt>
+                                        </p:tgtEl>
+                                        <p:attrNameLst>
+                                          <p:attrName>style.visibility</p:attrName>
+                                        </p:attrNameLst>
+                                      </p:cBhvr>
+                                      <p:to>
+                                        <p:strVal val="visible"/>
+                                      </p:to>
+                                    </p:set>
+                                  </p:childTnLst>
+                                </p:cTn>
+                              </p:par>
+                              <p:par>
+                                <p:cTn id="13" presetID="1" presetClass="entr" presetSubtype="0" fill="hold" nodeType="withEffect">
+                                  <p:stCondLst>
+                                    <p:cond delay="0"/>
+                                  </p:stCondLst>
+                                  <p:childTnLst>
+                                    <p:set>
+                                      <p:cBhvr>
+                                        <p:cTn id="14" dur="1" fill="hold">
+                                          <p:stCondLst>
+                                            <p:cond delay="0"/>
+                                          </p:stCondLst>
+                                        </p:cTn>
+                                        <p:tgtEl>
+                                          <p:spTgt spid="14">
+                                            <p:txEl>
+                                              <p:pRg st="3" end="3"/>
+                                            </p:txEl>
+                                          </p:spTgt>
+                                        </p:tgtEl>
+                                        <p:attrNameLst>
+                                          <p:attrName>style.visibility</p:attrName>
+                                        </p:attrNameLst>
+                                      </p:cBhvr>
+                                      <p:to>
+                                        <p:strVal val="visible"/>
+                                      </p:to>
+                                    </p:set>
+                                  </p:childTnLst>
+                                </p:cTn>
+                              </p:par>
+                              <p:par>
+                                <p:cTn id="15" presetID="1" presetClass="entr" presetSubtype="0" fill="hold" nodeType="withEffect">
+                                  <p:stCondLst>
+                                    <p:cond delay="0"/>
+                                  </p:stCondLst>
+                                  <p:childTnLst>
+                                    <p:set>
+                                      <p:cBhvr>
+                                        <p:cTn id="16" dur="1" fill="hold">
+                                          <p:stCondLst>
+                                            <p:cond delay="0"/>
+                                          </p:stCondLst>
+                                        </p:cTn>
+                                        <p:tgtEl>
+                                          <p:spTgt spid="14">
+                                            <p:txEl>
+                                              <p:pRg st="4" end="4"/>
+                                            </p:txEl>
+                                          </p:spTgt>
+                                        </p:tgtEl>
+                                        <p:attrNameLst>
+                                          <p:attrName>style.visibility</p:attrName>
+                                        </p:attrNameLst>
+                                      </p:cBhvr>
+                                      <p:to>
+                                        <p:strVal val="visible"/>
+                                      </p:to>
+                                    </p:set>
+                                  </p:childTnLst>
+                                </p:cTn>
+                              </p:par>
+                            </p:childTnLst>
+                          </p:cTn>
+                        </p:par>
+                      </p:childTnLst>
+                    </p:cTn>
+                  </p:par>
+                  <p:par>
+                    <p:cTn id="17" fill="hold">
+                      <p:stCondLst>
+                        <p:cond delay="indefinite"/>
+                      </p:stCondLst>
+                      <p:childTnLst>
+                        <p:par>
+                          <p:cTn id="18" fill="hold">
+                            <p:stCondLst>
+                              <p:cond delay="0"/>
+                            </p:stCondLst>
+                            <p:childTnLst>
+                              <p:par>
+                                <p:cTn id="19" presetID="1" presetClass="entr" presetSubtype="0" fill="hold" nodeType="clickEffect">
+                                  <p:stCondLst>
+                                    <p:cond delay="0"/>
+                                  </p:stCondLst>
+                                  <p:childTnLst>
+                                    <p:set>
+                                      <p:cBhvr>
+                                        <p:cTn id="20" dur="1" fill="hold">
+                                          <p:stCondLst>
+                                            <p:cond delay="0"/>
+                                          </p:stCondLst>
+                                        </p:cTn>
+                                        <p:tgtEl>
+                                          <p:spTgt spid="14">
+                                            <p:txEl>
+                                              <p:pRg st="5" end="5"/>
+                                            </p:txEl>
+                                          </p:spTgt>
+                                        </p:tgtEl>
+                                        <p:attrNameLst>
+                                          <p:attrName>style.visibility</p:attrName>
+                                        </p:attrNameLst>
+                                      </p:cBhvr>
+                                      <p:to>
+                                        <p:strVal val="visible"/>
+                                      </p:to>
+                                    </p:set>
+                                  </p:childTnLst>
+                                </p:cTn>
+                              </p:par>
+                              <p:par>
+                                <p:cTn id="21" presetID="1" presetClass="entr" presetSubtype="0" fill="hold" nodeType="withEffect">
+                                  <p:stCondLst>
+                                    <p:cond delay="0"/>
+                                  </p:stCondLst>
+                                  <p:childTnLst>
+                                    <p:set>
+                                      <p:cBhvr>
+                                        <p:cTn id="22" dur="1" fill="hold">
+                                          <p:stCondLst>
+                                            <p:cond delay="0"/>
+                                          </p:stCondLst>
+                                        </p:cTn>
+                                        <p:tgtEl>
+                                          <p:spTgt spid="14">
+                                            <p:txEl>
+                                              <p:pRg st="6" end="6"/>
+                                            </p:txEl>
+                                          </p:spTgt>
+                                        </p:tgtEl>
+                                        <p:attrNameLst>
+                                          <p:attrName>style.visibility</p:attrName>
+                                        </p:attrNameLst>
+                                      </p:cBhvr>
+                                      <p:to>
+                                        <p:strVal val="visible"/>
+                                      </p:to>
+                                    </p:set>
+                                  </p:childTnLst>
+                                </p:cTn>
+                              </p:par>
+                            </p:childTnLst>
+                          </p:cTn>
+                        </p:par>
+                      </p:childTnLst>
+                    </p:cTn>
+                  </p:par>
+                  <p:par>
+                    <p:cTn id="23" fill="hold">
+                      <p:stCondLst>
+                        <p:cond delay="indefinite"/>
+                      </p:stCondLst>
+                      <p:childTnLst>
+                        <p:par>
+                          <p:cTn id="24" fill="hold">
+                            <p:stCondLst>
+                              <p:cond delay="0"/>
+                            </p:stCondLst>
+                            <p:childTnLst>
+                              <p:par>
+                                <p:cTn id="25" presetID="1" presetClass="entr" presetSubtype="0" fill="hold" nodeType="clickEffect">
+                                  <p:stCondLst>
+                                    <p:cond delay="0"/>
+                                  </p:stCondLst>
+                                  <p:childTnLst>
+                                    <p:set>
+                                      <p:cBhvr>
+                                        <p:cTn id="26" dur="1" fill="hold">
+                                          <p:stCondLst>
+                                            <p:cond delay="0"/>
+                                          </p:stCondLst>
+                                        </p:cTn>
+                                        <p:tgtEl>
+                                          <p:spTgt spid="14">
+                                            <p:txEl>
+                                              <p:pRg st="7" end="7"/>
+                                            </p:txEl>
+                                          </p:spTgt>
+                                        </p:tgtEl>
+                                        <p:attrNameLst>
+                                          <p:attrName>style.visibility</p:attrName>
+                                        </p:attrNameLst>
+                                      </p:cBhvr>
+                                      <p:to>
+                                        <p:strVal val="visible"/>
+                                      </p:to>
+                                    </p:set>
+                                  </p:childTnLst>
+                                </p:cTn>
+                              </p:par>
+                            </p:childTnLst>
+                          </p:cTn>
+                        </p:par>
+                      </p:childTnLst>
+                    </p:cTn>
+                  </p:par>
+                  <p:par>
+                    <p:cTn id="27" fill="hold">
+                      <p:stCondLst>
+                        <p:cond delay="indefinite"/>
+                      </p:stCondLst>
+                      <p:childTnLst>
+                        <p:par>
+                          <p:cTn id="28" fill="hold">
+                            <p:stCondLst>
+                              <p:cond delay="0"/>
+                            </p:stCondLst>
+                            <p:childTnLst>
+                              <p:par>
+                                <p:cTn id="29" presetID="1" presetClass="entr" presetSubtype="0" fill="hold" nodeType="clickEffect">
+                                  <p:stCondLst>
+                                    <p:cond delay="0"/>
+                                  </p:stCondLst>
+                                  <p:childTnLst>
+                                    <p:set>
+                                      <p:cBhvr>
+                                        <p:cTn id="30" dur="1" fill="hold">
+                                          <p:stCondLst>
+                                            <p:cond delay="0"/>
+                                          </p:stCondLst>
+                                        </p:cTn>
+                                        <p:tgtEl>
+                                          <p:spTgt spid="14">
+                                            <p:txEl>
+                                              <p:pRg st="8" end="8"/>
+                                            </p:txEl>
+                                          </p:spTgt>
+                                        </p:tgtEl>
+                                        <p:attrNameLst>
+                                          <p:attrName>style.visibility</p:attrName>
+                                        </p:attrNameLst>
+                                      </p:cBhvr>
+                                      <p:to>
+                                        <p:strVal val="visible"/>
+                                      </p:to>
+                                    </p:set>
+                                  </p:childTnLst>
+                                </p:cTn>
+                              </p:par>
+                              <p:par>
+                                <p:cTn id="31" presetID="1" presetClass="entr" presetSubtype="0" fill="hold" nodeType="withEffect">
+                                  <p:stCondLst>
+                                    <p:cond delay="0"/>
+                                  </p:stCondLst>
+                                  <p:childTnLst>
+                                    <p:set>
+                                      <p:cBhvr>
+                                        <p:cTn id="32" dur="1" fill="hold">
+                                          <p:stCondLst>
+                                            <p:cond delay="0"/>
+                                          </p:stCondLst>
+                                        </p:cTn>
+                                        <p:tgtEl>
+                                          <p:spTgt spid="14">
+                                            <p:txEl>
+                                              <p:pRg st="9" end="9"/>
+                                            </p:txEl>
+                                          </p:spTgt>
+                                        </p:tgtEl>
+                                        <p:attrNameLst>
+                                          <p:attrName>style.visibility</p:attrName>
+                                        </p:attrNameLst>
+                                      </p:cBhvr>
+                                      <p:to>
+                                        <p:strVal val="visible"/>
+                                      </p:to>
+                                    </p:set>
+                                  </p:childTnLst>
+                                </p:cTn>
+                              </p:par>
+                            </p:childTnLst>
+                          </p:cTn>
+                        </p:par>
+                      </p:childTnLst>
+                    </p:cTn>
+                  </p:par>
+                </p:childTnLst>
+              </p:cTn>
+              <p:prevCondLst>
+                <p:cond evt="onPrev" delay="0">
+                  <p:tgtEl>
+                    <p:sldTgt/>
+                  </p:tgtEl>
+                </p:cond>
+              </p:prevCondLst>
+              <p:nextCondLst>
+                <p:cond evt="onNext" delay="0">
+                  <p:tgtEl>
+                    <p:sldTgt/>
+                  </p:tgtEl>
+                </p:cond>
+              </p:nextCondLst>
+            </p:seq>
+          </p:childTnLst>
+        </p:cTn>
       </p:par>
     </p:tnLst>
   </p:timing>
@@ -6280,11 +6700,7 @@
           <a:p>
             <a:r>
               <a:rPr lang="en-US" dirty="0" smtClean="0"/>
-              <a:t>NOAA </a:t>
-            </a:r>
-            <a:r>
-              <a:rPr lang="en-US" dirty="0" smtClean="0"/>
-              <a:t>GitHub Policy</a:t>
+              <a:t>NOAA GitHub Policy</a:t>
             </a:r>
             <a:endParaRPr lang="en-US" dirty="0"/>
           </a:p>
@@ -6454,7 +6870,618 @@
   <p:timing>
     <p:tnLst>
       <p:par>
-        <p:cTn id="1" dur="indefinite" restart="never" nodeType="tmRoot"/>
+        <p:cTn id="1" dur="indefinite" restart="never" nodeType="tmRoot">
+          <p:childTnLst>
+            <p:seq concurrent="1" nextAc="seek">
+              <p:cTn id="2" dur="indefinite" nodeType="mainSeq">
+                <p:childTnLst>
+                  <p:par>
+                    <p:cTn id="3" fill="hold">
+                      <p:stCondLst>
+                        <p:cond delay="indefinite"/>
+                      </p:stCondLst>
+                      <p:childTnLst>
+                        <p:par>
+                          <p:cTn id="4" fill="hold">
+                            <p:stCondLst>
+                              <p:cond delay="0"/>
+                            </p:stCondLst>
+                            <p:childTnLst>
+                              <p:par>
+                                <p:cTn id="5" presetID="1" presetClass="entr" presetSubtype="0" fill="hold" nodeType="clickEffect">
+                                  <p:stCondLst>
+                                    <p:cond delay="0"/>
+                                  </p:stCondLst>
+                                  <p:childTnLst>
+                                    <p:set>
+                                      <p:cBhvr>
+                                        <p:cTn id="6" dur="1" fill="hold">
+                                          <p:stCondLst>
+                                            <p:cond delay="0"/>
+                                          </p:stCondLst>
+                                        </p:cTn>
+                                        <p:tgtEl>
+                                          <p:spTgt spid="14">
+                                            <p:txEl>
+                                              <p:pRg st="0" end="0"/>
+                                            </p:txEl>
+                                          </p:spTgt>
+                                        </p:tgtEl>
+                                        <p:attrNameLst>
+                                          <p:attrName>style.visibility</p:attrName>
+                                        </p:attrNameLst>
+                                      </p:cBhvr>
+                                      <p:to>
+                                        <p:strVal val="visible"/>
+                                      </p:to>
+                                    </p:set>
+                                  </p:childTnLst>
+                                </p:cTn>
+                              </p:par>
+                            </p:childTnLst>
+                          </p:cTn>
+                        </p:par>
+                      </p:childTnLst>
+                    </p:cTn>
+                  </p:par>
+                  <p:par>
+                    <p:cTn id="7" fill="hold">
+                      <p:stCondLst>
+                        <p:cond delay="indefinite"/>
+                      </p:stCondLst>
+                      <p:childTnLst>
+                        <p:par>
+                          <p:cTn id="8" fill="hold">
+                            <p:stCondLst>
+                              <p:cond delay="0"/>
+                            </p:stCondLst>
+                            <p:childTnLst>
+                              <p:par>
+                                <p:cTn id="9" presetID="1" presetClass="entr" presetSubtype="0" fill="hold" nodeType="clickEffect">
+                                  <p:stCondLst>
+                                    <p:cond delay="0"/>
+                                  </p:stCondLst>
+                                  <p:childTnLst>
+                                    <p:set>
+                                      <p:cBhvr>
+                                        <p:cTn id="10" dur="1" fill="hold">
+                                          <p:stCondLst>
+                                            <p:cond delay="0"/>
+                                          </p:stCondLst>
+                                        </p:cTn>
+                                        <p:tgtEl>
+                                          <p:spTgt spid="14">
+                                            <p:txEl>
+                                              <p:pRg st="1" end="1"/>
+                                            </p:txEl>
+                                          </p:spTgt>
+                                        </p:tgtEl>
+                                        <p:attrNameLst>
+                                          <p:attrName>style.visibility</p:attrName>
+                                        </p:attrNameLst>
+                                      </p:cBhvr>
+                                      <p:to>
+                                        <p:strVal val="visible"/>
+                                      </p:to>
+                                    </p:set>
+                                  </p:childTnLst>
+                                </p:cTn>
+                              </p:par>
+                            </p:childTnLst>
+                          </p:cTn>
+                        </p:par>
+                      </p:childTnLst>
+                    </p:cTn>
+                  </p:par>
+                  <p:par>
+                    <p:cTn id="11" fill="hold">
+                      <p:stCondLst>
+                        <p:cond delay="indefinite"/>
+                      </p:stCondLst>
+                      <p:childTnLst>
+                        <p:par>
+                          <p:cTn id="12" fill="hold">
+                            <p:stCondLst>
+                              <p:cond delay="0"/>
+                            </p:stCondLst>
+                            <p:childTnLst>
+                              <p:par>
+                                <p:cTn id="13" presetID="1" presetClass="entr" presetSubtype="0" fill="hold" nodeType="clickEffect">
+                                  <p:stCondLst>
+                                    <p:cond delay="0"/>
+                                  </p:stCondLst>
+                                  <p:childTnLst>
+                                    <p:set>
+                                      <p:cBhvr>
+                                        <p:cTn id="14" dur="1" fill="hold">
+                                          <p:stCondLst>
+                                            <p:cond delay="0"/>
+                                          </p:stCondLst>
+                                        </p:cTn>
+                                        <p:tgtEl>
+                                          <p:spTgt spid="14">
+                                            <p:txEl>
+                                              <p:pRg st="2" end="2"/>
+                                            </p:txEl>
+                                          </p:spTgt>
+                                        </p:tgtEl>
+                                        <p:attrNameLst>
+                                          <p:attrName>style.visibility</p:attrName>
+                                        </p:attrNameLst>
+                                      </p:cBhvr>
+                                      <p:to>
+                                        <p:strVal val="visible"/>
+                                      </p:to>
+                                    </p:set>
+                                  </p:childTnLst>
+                                </p:cTn>
+                              </p:par>
+                            </p:childTnLst>
+                          </p:cTn>
+                        </p:par>
+                      </p:childTnLst>
+                    </p:cTn>
+                  </p:par>
+                  <p:par>
+                    <p:cTn id="15" fill="hold">
+                      <p:stCondLst>
+                        <p:cond delay="indefinite"/>
+                      </p:stCondLst>
+                      <p:childTnLst>
+                        <p:par>
+                          <p:cTn id="16" fill="hold">
+                            <p:stCondLst>
+                              <p:cond delay="0"/>
+                            </p:stCondLst>
+                            <p:childTnLst>
+                              <p:par>
+                                <p:cTn id="17" presetID="1" presetClass="entr" presetSubtype="0" fill="hold" nodeType="clickEffect">
+                                  <p:stCondLst>
+                                    <p:cond delay="0"/>
+                                  </p:stCondLst>
+                                  <p:childTnLst>
+                                    <p:set>
+                                      <p:cBhvr>
+                                        <p:cTn id="18" dur="1" fill="hold">
+                                          <p:stCondLst>
+                                            <p:cond delay="0"/>
+                                          </p:stCondLst>
+                                        </p:cTn>
+                                        <p:tgtEl>
+                                          <p:spTgt spid="14">
+                                            <p:txEl>
+                                              <p:pRg st="3" end="3"/>
+                                            </p:txEl>
+                                          </p:spTgt>
+                                        </p:tgtEl>
+                                        <p:attrNameLst>
+                                          <p:attrName>style.visibility</p:attrName>
+                                        </p:attrNameLst>
+                                      </p:cBhvr>
+                                      <p:to>
+                                        <p:strVal val="visible"/>
+                                      </p:to>
+                                    </p:set>
+                                  </p:childTnLst>
+                                </p:cTn>
+                              </p:par>
+                            </p:childTnLst>
+                          </p:cTn>
+                        </p:par>
+                      </p:childTnLst>
+                    </p:cTn>
+                  </p:par>
+                  <p:par>
+                    <p:cTn id="19" fill="hold">
+                      <p:stCondLst>
+                        <p:cond delay="indefinite"/>
+                      </p:stCondLst>
+                      <p:childTnLst>
+                        <p:par>
+                          <p:cTn id="20" fill="hold">
+                            <p:stCondLst>
+                              <p:cond delay="0"/>
+                            </p:stCondLst>
+                            <p:childTnLst>
+                              <p:par>
+                                <p:cTn id="21" presetID="1" presetClass="entr" presetSubtype="0" fill="hold" nodeType="clickEffect">
+                                  <p:stCondLst>
+                                    <p:cond delay="0"/>
+                                  </p:stCondLst>
+                                  <p:childTnLst>
+                                    <p:set>
+                                      <p:cBhvr>
+                                        <p:cTn id="22" dur="1" fill="hold">
+                                          <p:stCondLst>
+                                            <p:cond delay="0"/>
+                                          </p:stCondLst>
+                                        </p:cTn>
+                                        <p:tgtEl>
+                                          <p:spTgt spid="14">
+                                            <p:txEl>
+                                              <p:pRg st="4" end="4"/>
+                                            </p:txEl>
+                                          </p:spTgt>
+                                        </p:tgtEl>
+                                        <p:attrNameLst>
+                                          <p:attrName>style.visibility</p:attrName>
+                                        </p:attrNameLst>
+                                      </p:cBhvr>
+                                      <p:to>
+                                        <p:strVal val="visible"/>
+                                      </p:to>
+                                    </p:set>
+                                  </p:childTnLst>
+                                </p:cTn>
+                              </p:par>
+                            </p:childTnLst>
+                          </p:cTn>
+                        </p:par>
+                      </p:childTnLst>
+                    </p:cTn>
+                  </p:par>
+                  <p:par>
+                    <p:cTn id="23" fill="hold">
+                      <p:stCondLst>
+                        <p:cond delay="indefinite"/>
+                      </p:stCondLst>
+                      <p:childTnLst>
+                        <p:par>
+                          <p:cTn id="24" fill="hold">
+                            <p:stCondLst>
+                              <p:cond delay="0"/>
+                            </p:stCondLst>
+                            <p:childTnLst>
+                              <p:par>
+                                <p:cTn id="25" presetID="1" presetClass="entr" presetSubtype="0" fill="hold" nodeType="clickEffect">
+                                  <p:stCondLst>
+                                    <p:cond delay="0"/>
+                                  </p:stCondLst>
+                                  <p:childTnLst>
+                                    <p:set>
+                                      <p:cBhvr>
+                                        <p:cTn id="26" dur="1" fill="hold">
+                                          <p:stCondLst>
+                                            <p:cond delay="0"/>
+                                          </p:stCondLst>
+                                        </p:cTn>
+                                        <p:tgtEl>
+                                          <p:spTgt spid="14">
+                                            <p:txEl>
+                                              <p:pRg st="5" end="5"/>
+                                            </p:txEl>
+                                          </p:spTgt>
+                                        </p:tgtEl>
+                                        <p:attrNameLst>
+                                          <p:attrName>style.visibility</p:attrName>
+                                        </p:attrNameLst>
+                                      </p:cBhvr>
+                                      <p:to>
+                                        <p:strVal val="visible"/>
+                                      </p:to>
+                                    </p:set>
+                                  </p:childTnLst>
+                                </p:cTn>
+                              </p:par>
+                            </p:childTnLst>
+                          </p:cTn>
+                        </p:par>
+                      </p:childTnLst>
+                    </p:cTn>
+                  </p:par>
+                  <p:par>
+                    <p:cTn id="27" fill="hold">
+                      <p:stCondLst>
+                        <p:cond delay="indefinite"/>
+                      </p:stCondLst>
+                      <p:childTnLst>
+                        <p:par>
+                          <p:cTn id="28" fill="hold">
+                            <p:stCondLst>
+                              <p:cond delay="0"/>
+                            </p:stCondLst>
+                            <p:childTnLst>
+                              <p:par>
+                                <p:cTn id="29" presetID="1" presetClass="entr" presetSubtype="0" fill="hold" nodeType="clickEffect">
+                                  <p:stCondLst>
+                                    <p:cond delay="0"/>
+                                  </p:stCondLst>
+                                  <p:childTnLst>
+                                    <p:set>
+                                      <p:cBhvr>
+                                        <p:cTn id="30" dur="1" fill="hold">
+                                          <p:stCondLst>
+                                            <p:cond delay="0"/>
+                                          </p:stCondLst>
+                                        </p:cTn>
+                                        <p:tgtEl>
+                                          <p:spTgt spid="14">
+                                            <p:txEl>
+                                              <p:pRg st="6" end="6"/>
+                                            </p:txEl>
+                                          </p:spTgt>
+                                        </p:tgtEl>
+                                        <p:attrNameLst>
+                                          <p:attrName>style.visibility</p:attrName>
+                                        </p:attrNameLst>
+                                      </p:cBhvr>
+                                      <p:to>
+                                        <p:strVal val="visible"/>
+                                      </p:to>
+                                    </p:set>
+                                  </p:childTnLst>
+                                </p:cTn>
+                              </p:par>
+                            </p:childTnLst>
+                          </p:cTn>
+                        </p:par>
+                      </p:childTnLst>
+                    </p:cTn>
+                  </p:par>
+                  <p:par>
+                    <p:cTn id="31" fill="hold">
+                      <p:stCondLst>
+                        <p:cond delay="indefinite"/>
+                      </p:stCondLst>
+                      <p:childTnLst>
+                        <p:par>
+                          <p:cTn id="32" fill="hold">
+                            <p:stCondLst>
+                              <p:cond delay="0"/>
+                            </p:stCondLst>
+                            <p:childTnLst>
+                              <p:par>
+                                <p:cTn id="33" presetID="1" presetClass="entr" presetSubtype="0" fill="hold" nodeType="clickEffect">
+                                  <p:stCondLst>
+                                    <p:cond delay="0"/>
+                                  </p:stCondLst>
+                                  <p:childTnLst>
+                                    <p:set>
+                                      <p:cBhvr>
+                                        <p:cTn id="34" dur="1" fill="hold">
+                                          <p:stCondLst>
+                                            <p:cond delay="0"/>
+                                          </p:stCondLst>
+                                        </p:cTn>
+                                        <p:tgtEl>
+                                          <p:spTgt spid="14">
+                                            <p:txEl>
+                                              <p:pRg st="7" end="7"/>
+                                            </p:txEl>
+                                          </p:spTgt>
+                                        </p:tgtEl>
+                                        <p:attrNameLst>
+                                          <p:attrName>style.visibility</p:attrName>
+                                        </p:attrNameLst>
+                                      </p:cBhvr>
+                                      <p:to>
+                                        <p:strVal val="visible"/>
+                                      </p:to>
+                                    </p:set>
+                                  </p:childTnLst>
+                                </p:cTn>
+                              </p:par>
+                            </p:childTnLst>
+                          </p:cTn>
+                        </p:par>
+                      </p:childTnLst>
+                    </p:cTn>
+                  </p:par>
+                  <p:par>
+                    <p:cTn id="35" fill="hold">
+                      <p:stCondLst>
+                        <p:cond delay="indefinite"/>
+                      </p:stCondLst>
+                      <p:childTnLst>
+                        <p:par>
+                          <p:cTn id="36" fill="hold">
+                            <p:stCondLst>
+                              <p:cond delay="0"/>
+                            </p:stCondLst>
+                            <p:childTnLst>
+                              <p:par>
+                                <p:cTn id="37" presetID="1" presetClass="entr" presetSubtype="0" fill="hold" nodeType="clickEffect">
+                                  <p:stCondLst>
+                                    <p:cond delay="0"/>
+                                  </p:stCondLst>
+                                  <p:childTnLst>
+                                    <p:set>
+                                      <p:cBhvr>
+                                        <p:cTn id="38" dur="1" fill="hold">
+                                          <p:stCondLst>
+                                            <p:cond delay="0"/>
+                                          </p:stCondLst>
+                                        </p:cTn>
+                                        <p:tgtEl>
+                                          <p:spTgt spid="14">
+                                            <p:txEl>
+                                              <p:pRg st="8" end="8"/>
+                                            </p:txEl>
+                                          </p:spTgt>
+                                        </p:tgtEl>
+                                        <p:attrNameLst>
+                                          <p:attrName>style.visibility</p:attrName>
+                                        </p:attrNameLst>
+                                      </p:cBhvr>
+                                      <p:to>
+                                        <p:strVal val="visible"/>
+                                      </p:to>
+                                    </p:set>
+                                  </p:childTnLst>
+                                </p:cTn>
+                              </p:par>
+                            </p:childTnLst>
+                          </p:cTn>
+                        </p:par>
+                      </p:childTnLst>
+                    </p:cTn>
+                  </p:par>
+                  <p:par>
+                    <p:cTn id="39" fill="hold">
+                      <p:stCondLst>
+                        <p:cond delay="indefinite"/>
+                      </p:stCondLst>
+                      <p:childTnLst>
+                        <p:par>
+                          <p:cTn id="40" fill="hold">
+                            <p:stCondLst>
+                              <p:cond delay="0"/>
+                            </p:stCondLst>
+                            <p:childTnLst>
+                              <p:par>
+                                <p:cTn id="41" presetID="1" presetClass="entr" presetSubtype="0" fill="hold" nodeType="clickEffect">
+                                  <p:stCondLst>
+                                    <p:cond delay="0"/>
+                                  </p:stCondLst>
+                                  <p:childTnLst>
+                                    <p:set>
+                                      <p:cBhvr>
+                                        <p:cTn id="42" dur="1" fill="hold">
+                                          <p:stCondLst>
+                                            <p:cond delay="0"/>
+                                          </p:stCondLst>
+                                        </p:cTn>
+                                        <p:tgtEl>
+                                          <p:spTgt spid="14">
+                                            <p:txEl>
+                                              <p:pRg st="9" end="9"/>
+                                            </p:txEl>
+                                          </p:spTgt>
+                                        </p:tgtEl>
+                                        <p:attrNameLst>
+                                          <p:attrName>style.visibility</p:attrName>
+                                        </p:attrNameLst>
+                                      </p:cBhvr>
+                                      <p:to>
+                                        <p:strVal val="visible"/>
+                                      </p:to>
+                                    </p:set>
+                                  </p:childTnLst>
+                                </p:cTn>
+                              </p:par>
+                            </p:childTnLst>
+                          </p:cTn>
+                        </p:par>
+                      </p:childTnLst>
+                    </p:cTn>
+                  </p:par>
+                  <p:par>
+                    <p:cTn id="43" fill="hold">
+                      <p:stCondLst>
+                        <p:cond delay="indefinite"/>
+                      </p:stCondLst>
+                      <p:childTnLst>
+                        <p:par>
+                          <p:cTn id="44" fill="hold">
+                            <p:stCondLst>
+                              <p:cond delay="0"/>
+                            </p:stCondLst>
+                            <p:childTnLst>
+                              <p:par>
+                                <p:cTn id="45" presetID="1" presetClass="entr" presetSubtype="0" fill="hold" nodeType="clickEffect">
+                                  <p:stCondLst>
+                                    <p:cond delay="0"/>
+                                  </p:stCondLst>
+                                  <p:childTnLst>
+                                    <p:set>
+                                      <p:cBhvr>
+                                        <p:cTn id="46" dur="1" fill="hold">
+                                          <p:stCondLst>
+                                            <p:cond delay="0"/>
+                                          </p:stCondLst>
+                                        </p:cTn>
+                                        <p:tgtEl>
+                                          <p:spTgt spid="14">
+                                            <p:txEl>
+                                              <p:pRg st="10" end="10"/>
+                                            </p:txEl>
+                                          </p:spTgt>
+                                        </p:tgtEl>
+                                        <p:attrNameLst>
+                                          <p:attrName>style.visibility</p:attrName>
+                                        </p:attrNameLst>
+                                      </p:cBhvr>
+                                      <p:to>
+                                        <p:strVal val="visible"/>
+                                      </p:to>
+                                    </p:set>
+                                  </p:childTnLst>
+                                </p:cTn>
+                              </p:par>
+                            </p:childTnLst>
+                          </p:cTn>
+                        </p:par>
+                      </p:childTnLst>
+                    </p:cTn>
+                  </p:par>
+                  <p:par>
+                    <p:cTn id="47" fill="hold">
+                      <p:stCondLst>
+                        <p:cond delay="indefinite"/>
+                      </p:stCondLst>
+                      <p:childTnLst>
+                        <p:par>
+                          <p:cTn id="48" fill="hold">
+                            <p:stCondLst>
+                              <p:cond delay="0"/>
+                            </p:stCondLst>
+                            <p:childTnLst>
+                              <p:par>
+                                <p:cTn id="49" presetID="1" presetClass="entr" presetSubtype="0" fill="hold" nodeType="clickEffect">
+                                  <p:stCondLst>
+                                    <p:cond delay="0"/>
+                                  </p:stCondLst>
+                                  <p:childTnLst>
+                                    <p:set>
+                                      <p:cBhvr>
+                                        <p:cTn id="50" dur="1" fill="hold">
+                                          <p:stCondLst>
+                                            <p:cond delay="0"/>
+                                          </p:stCondLst>
+                                        </p:cTn>
+                                        <p:tgtEl>
+                                          <p:spTgt spid="14">
+                                            <p:txEl>
+                                              <p:pRg st="11" end="11"/>
+                                            </p:txEl>
+                                          </p:spTgt>
+                                        </p:tgtEl>
+                                        <p:attrNameLst>
+                                          <p:attrName>style.visibility</p:attrName>
+                                        </p:attrNameLst>
+                                      </p:cBhvr>
+                                      <p:to>
+                                        <p:strVal val="visible"/>
+                                      </p:to>
+                                    </p:set>
+                                  </p:childTnLst>
+                                </p:cTn>
+                              </p:par>
+                            </p:childTnLst>
+                          </p:cTn>
+                        </p:par>
+                      </p:childTnLst>
+                    </p:cTn>
+                  </p:par>
+                </p:childTnLst>
+              </p:cTn>
+              <p:prevCondLst>
+                <p:cond evt="onPrev" delay="0">
+                  <p:tgtEl>
+                    <p:sldTgt/>
+                  </p:tgtEl>
+                </p:cond>
+              </p:prevCondLst>
+              <p:nextCondLst>
+                <p:cond evt="onNext" delay="0">
+                  <p:tgtEl>
+                    <p:sldTgt/>
+                  </p:tgtEl>
+                </p:cond>
+              </p:nextCondLst>
+            </p:seq>
+          </p:childTnLst>
+        </p:cTn>
       </p:par>
     </p:tnLst>
   </p:timing>
@@ -6555,11 +7582,7 @@
             <a:pPr lvl="1"/>
             <a:r>
               <a:rPr lang="en-US" dirty="0" smtClean="0"/>
-              <a:t>Software </a:t>
-            </a:r>
-            <a:r>
-              <a:rPr lang="en-US" dirty="0" smtClean="0"/>
-              <a:t>repository for project version control</a:t>
+              <a:t>Software repository for project version control</a:t>
             </a:r>
           </a:p>
           <a:p>
@@ -6582,11 +7605,7 @@
             </a:r>
             <a:r>
               <a:rPr lang="en-US" dirty="0" smtClean="0"/>
-              <a:t> </a:t>
-            </a:r>
-            <a:r>
-              <a:rPr lang="en-US" dirty="0" smtClean="0"/>
-              <a:t>tools</a:t>
+              <a:t> tools</a:t>
             </a:r>
           </a:p>
           <a:p>
@@ -6748,11 +7767,7 @@
             <a:pPr lvl="1"/>
             <a:r>
               <a:rPr lang="en-US" dirty="0" smtClean="0"/>
-              <a:t>Project </a:t>
-            </a:r>
-            <a:r>
-              <a:rPr lang="en-US" dirty="0" smtClean="0"/>
-              <a:t>documentation</a:t>
+              <a:t>Project documentation</a:t>
             </a:r>
             <a:endParaRPr lang="en-US" dirty="0"/>
           </a:p>
@@ -6768,13 +7783,8 @@
             </a:r>
             <a:r>
               <a:rPr lang="en-US" dirty="0" smtClean="0"/>
-              <a:t> notebooks to display test and project data in GitHub </a:t>
-            </a:r>
-            <a:r>
-              <a:rPr lang="en-US" dirty="0" smtClean="0"/>
-              <a:t>webpage (previously rendered only)</a:t>
-            </a:r>
-            <a:endParaRPr lang="en-US" dirty="0" smtClean="0"/>
+              <a:t> notebooks to display test and project data in GitHub webpage (previously rendered only)</a:t>
+            </a:r>
           </a:p>
           <a:p>
             <a:pPr lvl="1"/>
@@ -7038,7 +8048,7 @@
             <a:spLocks noGrp="1"/>
           </p:cNvSpPr>
           <p:nvPr>
-            <p:ph type="ctrTitle"/>
+            <p:ph type="title"/>
           </p:nvPr>
         </p:nvSpPr>
         <p:spPr/>
@@ -7048,7 +8058,7 @@
           <a:p>
             <a:r>
               <a:rPr lang="en-US" dirty="0" smtClean="0"/>
-              <a:t>Hands-on with GitHub</a:t>
+              <a:t>Questions?</a:t>
             </a:r>
             <a:endParaRPr lang="en-US" dirty="0"/>
           </a:p>
@@ -7056,12 +8066,12 @@
       </p:sp>
       <p:sp>
         <p:nvSpPr>
-          <p:cNvPr id="3" name="Subtitle 2"/>
-          <p:cNvSpPr>
-            <a:spLocks noGrp="1"/>
-          </p:cNvSpPr>
-          <p:nvPr>
-            <p:ph type="subTitle" idx="1"/>
+          <p:cNvPr id="3" name="Content Placeholder 2"/>
+          <p:cNvSpPr>
+            <a:spLocks noGrp="1"/>
+          </p:cNvSpPr>
+          <p:nvPr>
+            <p:ph idx="1"/>
           </p:nvPr>
         </p:nvSpPr>
         <p:spPr/>
@@ -7071,12 +8081,48 @@
           <a:p>
             <a:r>
               <a:rPr lang="en-US" dirty="0" smtClean="0"/>
-              <a:t>Let’s get our </a:t>
-            </a:r>
-            <a:r>
-              <a:rPr lang="en-US" dirty="0" smtClean="0"/>
-              <a:t>Feet wet</a:t>
-            </a:r>
+              <a:t>If you’re not interested in attending the hands-on workshop, thank you for attending!</a:t>
+            </a:r>
+            <a:br>
+              <a:rPr lang="en-US" dirty="0" smtClean="0"/>
+            </a:br>
+            <a:r>
+              <a:rPr lang="en-US" dirty="0" smtClean="0"/>
+              <a:t/>
+            </a:r>
+            <a:br>
+              <a:rPr lang="en-US" dirty="0" smtClean="0"/>
+            </a:br>
+            <a:endParaRPr lang="en-US" dirty="0" smtClean="0"/>
+          </a:p>
+          <a:p>
+            <a:r>
+              <a:rPr lang="en-US" dirty="0" smtClean="0"/>
+              <a:t>If you will be attending the hands-on workshop, we will resume after a 15 minute break.</a:t>
+            </a:r>
+            <a:endParaRPr lang="en-US" dirty="0"/>
+          </a:p>
+        </p:txBody>
+      </p:sp>
+      <p:sp>
+        <p:nvSpPr>
+          <p:cNvPr id="4" name="Slide Number Placeholder 3"/>
+          <p:cNvSpPr>
+            <a:spLocks noGrp="1"/>
+          </p:cNvSpPr>
+          <p:nvPr>
+            <p:ph type="sldNum" sz="quarter" idx="12"/>
+          </p:nvPr>
+        </p:nvSpPr>
+        <p:spPr/>
+        <p:txBody>
+          <a:bodyPr/>
+          <a:lstStyle/>
+          <a:p>
+            <a:fld id="{2A013F82-EE5E-44EE-A61D-E31C6657F26F}" type="slidenum">
+              <a:rPr lang="en-US" smtClean="0"/>
+              <a:t>17</a:t>
+            </a:fld>
             <a:endParaRPr lang="en-US" dirty="0"/>
           </a:p>
         </p:txBody>
@@ -7084,19 +8130,23 @@
     </p:spTree>
     <p:extLst>
       <p:ext uri="{BB962C8B-B14F-4D97-AF65-F5344CB8AC3E}">
-        <p14:creationId xmlns:p14="http://schemas.microsoft.com/office/powerpoint/2010/main" val="3915514084"/>
+        <p14:creationId xmlns:p14="http://schemas.microsoft.com/office/powerpoint/2010/main" val="588507306"/>
       </p:ext>
     </p:extLst>
   </p:cSld>
   <p:clrMapOvr>
     <a:masterClrMapping/>
   </p:clrMapOvr>
-  <mc:AlternateContent xmlns:mc="http://schemas.openxmlformats.org/markup-compatibility/2006" xmlns:p14="http://schemas.microsoft.com/office/powerpoint/2010/main">
-    <mc:Choice Requires="p14">
-      <p:transition p14:dur="0"/>
+  <mc:AlternateContent xmlns:mc="http://schemas.openxmlformats.org/markup-compatibility/2006">
+    <mc:Choice xmlns:p14="http://schemas.microsoft.com/office/powerpoint/2010/main" Requires="p14">
+      <p:transition spd="med" p14:dur="700" advTm="60000">
+        <p:fade/>
+      </p:transition>
     </mc:Choice>
-    <mc:Fallback xmlns="">
-      <p:transition/>
+    <mc:Fallback>
+      <p:transition spd="med" advTm="60000">
+        <p:fade/>
+      </p:transition>
     </mc:Fallback>
   </mc:AlternateContent>
   <p:timing>
@@ -7133,7 +8183,7 @@
             <a:spLocks noGrp="1"/>
           </p:cNvSpPr>
           <p:nvPr>
-            <p:ph type="title"/>
+            <p:ph type="ctrTitle"/>
           </p:nvPr>
         </p:nvSpPr>
         <p:spPr/>
@@ -7143,7 +8193,7 @@
           <a:p>
             <a:r>
               <a:rPr lang="en-US" dirty="0" smtClean="0"/>
-              <a:t>Link to workshop repository</a:t>
+              <a:t>Hands-on with GitHub</a:t>
             </a:r>
             <a:endParaRPr lang="en-US" dirty="0"/>
           </a:p>
@@ -7151,12 +8201,12 @@
       </p:sp>
       <p:sp>
         <p:nvSpPr>
-          <p:cNvPr id="3" name="Content Placeholder 2"/>
-          <p:cNvSpPr>
-            <a:spLocks noGrp="1"/>
-          </p:cNvSpPr>
-          <p:nvPr>
-            <p:ph idx="1"/>
+          <p:cNvPr id="3" name="Subtitle 2"/>
+          <p:cNvSpPr>
+            <a:spLocks noGrp="1"/>
+          </p:cNvSpPr>
+          <p:nvPr>
+            <p:ph type="subTitle" idx="1"/>
           </p:nvPr>
         </p:nvSpPr>
         <p:spPr/>
@@ -7165,95 +8215,9 @@
           <a:lstStyle/>
           <a:p>
             <a:r>
-              <a:rPr lang="en-US" dirty="0"/>
-              <a:t>Link to </a:t>
-            </a:r>
-            <a:r>
-              <a:rPr lang="en-US" dirty="0" smtClean="0"/>
-              <a:t>workshop repository</a:t>
-            </a:r>
-            <a:endParaRPr lang="en-US" dirty="0"/>
-          </a:p>
-          <a:p>
-            <a:pPr lvl="1"/>
-            <a:r>
-              <a:rPr lang="en-US" dirty="0" smtClean="0">
-                <a:hlinkClick r:id="rId2"/>
-              </a:rPr>
-              <a:t>https</a:t>
-            </a:r>
-            <a:r>
-              <a:rPr lang="en-US" dirty="0">
-                <a:hlinkClick r:id="rId2"/>
-              </a:rPr>
-              <a:t>://</a:t>
-            </a:r>
-            <a:r>
-              <a:rPr lang="en-US" dirty="0" smtClean="0">
-                <a:hlinkClick r:id="rId2"/>
-              </a:rPr>
-              <a:t>github.com/NOAA-PMEL/PMEL-training</a:t>
-            </a:r>
-            <a:r>
-              <a:rPr lang="en-US" dirty="0" smtClean="0"/>
-              <a:t/>
-            </a:r>
-            <a:br>
-              <a:rPr lang="en-US" dirty="0" smtClean="0"/>
-            </a:br>
-            <a:r>
-              <a:rPr lang="en-US" dirty="0" smtClean="0"/>
-              <a:t/>
-            </a:r>
-            <a:br>
-              <a:rPr lang="en-US" dirty="0" smtClean="0"/>
-            </a:br>
-            <a:endParaRPr lang="en-US" dirty="0" smtClean="0"/>
-          </a:p>
-          <a:p>
-            <a:r>
-              <a:rPr lang="en-US" dirty="0" smtClean="0"/>
-              <a:t>Link to workshop worksheet</a:t>
-            </a:r>
-          </a:p>
-          <a:p>
-            <a:pPr lvl="1"/>
-            <a:r>
-              <a:rPr lang="en-US" dirty="0">
-                <a:hlinkClick r:id="rId3"/>
-              </a:rPr>
-              <a:t>https://github.com/NOAA-PMEL/PMEL-training/blob/master/0-Workshop/workshop_guide.md</a:t>
-            </a:r>
-            <a:endParaRPr lang="en-US" dirty="0"/>
-          </a:p>
-          <a:p>
-            <a:pPr lvl="1"/>
-            <a:endParaRPr lang="en-US" dirty="0"/>
-          </a:p>
-          <a:p>
-            <a:endParaRPr lang="en-US" dirty="0"/>
-          </a:p>
-        </p:txBody>
-      </p:sp>
-      <p:sp>
-        <p:nvSpPr>
-          <p:cNvPr id="4" name="Slide Number Placeholder 3"/>
-          <p:cNvSpPr>
-            <a:spLocks noGrp="1"/>
-          </p:cNvSpPr>
-          <p:nvPr>
-            <p:ph type="sldNum" sz="quarter" idx="12"/>
-          </p:nvPr>
-        </p:nvSpPr>
-        <p:spPr/>
-        <p:txBody>
-          <a:bodyPr/>
-          <a:lstStyle/>
-          <a:p>
-            <a:fld id="{2A013F82-EE5E-44EE-A61D-E31C6657F26F}" type="slidenum">
-              <a:rPr lang="en-US" smtClean="0"/>
-              <a:t>18</a:t>
-            </a:fld>
+              <a:rPr lang="en-US" dirty="0" smtClean="0"/>
+              <a:t>Let’s get our Feet wet</a:t>
+            </a:r>
             <a:endParaRPr lang="en-US" dirty="0"/>
           </a:p>
         </p:txBody>
@@ -7261,7 +8225,7 @@
     </p:spTree>
     <p:extLst>
       <p:ext uri="{BB962C8B-B14F-4D97-AF65-F5344CB8AC3E}">
-        <p14:creationId xmlns:p14="http://schemas.microsoft.com/office/powerpoint/2010/main" val="2542312034"/>
+        <p14:creationId xmlns:p14="http://schemas.microsoft.com/office/powerpoint/2010/main" val="3915514084"/>
       </p:ext>
     </p:extLst>
   </p:cSld>
@@ -7270,14 +8234,10 @@
   </p:clrMapOvr>
   <mc:AlternateContent xmlns:mc="http://schemas.openxmlformats.org/markup-compatibility/2006" xmlns:p14="http://schemas.microsoft.com/office/powerpoint/2010/main">
     <mc:Choice Requires="p14">
-      <p:transition spd="med" p14:dur="700">
-        <p:fade/>
-      </p:transition>
+      <p:transition p14:dur="0"/>
     </mc:Choice>
     <mc:Fallback xmlns="">
-      <p:transition spd="med">
-        <p:fade/>
-      </p:transition>
+      <p:transition/>
     </mc:Fallback>
   </mc:AlternateContent>
   <p:timing>
@@ -7309,7 +8269,7 @@
       </p:grpSpPr>
       <p:sp>
         <p:nvSpPr>
-          <p:cNvPr id="5" name="Title 4"/>
+          <p:cNvPr id="2" name="Title 1"/>
           <p:cNvSpPr>
             <a:spLocks noGrp="1"/>
           </p:cNvSpPr>
@@ -7324,7 +8284,7 @@
           <a:p>
             <a:r>
               <a:rPr lang="en-US" dirty="0" smtClean="0"/>
-              <a:t>Thank you</a:t>
+              <a:t>Link to workshop repository</a:t>
             </a:r>
             <a:endParaRPr lang="en-US" dirty="0"/>
           </a:p>
@@ -7332,12 +8292,12 @@
       </p:sp>
       <p:sp>
         <p:nvSpPr>
-          <p:cNvPr id="6" name="Text Placeholder 5"/>
-          <p:cNvSpPr>
-            <a:spLocks noGrp="1"/>
-          </p:cNvSpPr>
-          <p:nvPr>
-            <p:ph type="body" idx="1"/>
+          <p:cNvPr id="3" name="Content Placeholder 2"/>
+          <p:cNvSpPr>
+            <a:spLocks noGrp="1"/>
+          </p:cNvSpPr>
+          <p:nvPr>
+            <p:ph idx="1"/>
           </p:nvPr>
         </p:nvSpPr>
         <p:spPr/>
@@ -7346,9 +8306,72 @@
           <a:lstStyle/>
           <a:p>
             <a:r>
-              <a:rPr lang="en-US" dirty="0" smtClean="0"/>
-              <a:t>EOF</a:t>
-            </a:r>
+              <a:rPr lang="en-US" dirty="0"/>
+              <a:t>Link to </a:t>
+            </a:r>
+            <a:r>
+              <a:rPr lang="en-US" dirty="0" smtClean="0"/>
+              <a:t>workshop repository</a:t>
+            </a:r>
+            <a:endParaRPr lang="en-US" dirty="0"/>
+          </a:p>
+          <a:p>
+            <a:pPr lvl="1"/>
+            <a:r>
+              <a:rPr lang="en-US" dirty="0" smtClean="0">
+                <a:hlinkClick r:id="rId2"/>
+              </a:rPr>
+              <a:t>https</a:t>
+            </a:r>
+            <a:r>
+              <a:rPr lang="en-US" dirty="0">
+                <a:hlinkClick r:id="rId2"/>
+              </a:rPr>
+              <a:t>://</a:t>
+            </a:r>
+            <a:r>
+              <a:rPr lang="en-US" dirty="0" smtClean="0">
+                <a:hlinkClick r:id="rId2"/>
+              </a:rPr>
+              <a:t>github.com/NOAA-PMEL/PMEL-training</a:t>
+            </a:r>
+            <a:r>
+              <a:rPr lang="en-US" dirty="0" smtClean="0"/>
+              <a:t/>
+            </a:r>
+            <a:br>
+              <a:rPr lang="en-US" dirty="0" smtClean="0"/>
+            </a:br>
+            <a:r>
+              <a:rPr lang="en-US" dirty="0" smtClean="0"/>
+              <a:t/>
+            </a:r>
+            <a:br>
+              <a:rPr lang="en-US" dirty="0" smtClean="0"/>
+            </a:br>
+            <a:endParaRPr lang="en-US" dirty="0" smtClean="0"/>
+          </a:p>
+          <a:p>
+            <a:r>
+              <a:rPr lang="en-US" dirty="0" smtClean="0"/>
+              <a:t>Link to workshop worksheet</a:t>
+            </a:r>
+          </a:p>
+          <a:p>
+            <a:pPr lvl="1"/>
+            <a:r>
+              <a:rPr lang="en-US" dirty="0">
+                <a:hlinkClick r:id="rId3"/>
+              </a:rPr>
+              <a:t>https://github.com/NOAA-PMEL/PMEL-training/blob/master/0-Workshop/workshop_guide.md</a:t>
+            </a:r>
+            <a:endParaRPr lang="en-US" dirty="0"/>
+          </a:p>
+          <a:p>
+            <a:pPr lvl="1"/>
+            <a:endParaRPr lang="en-US" dirty="0"/>
+          </a:p>
+          <a:p>
             <a:endParaRPr lang="en-US" dirty="0"/>
           </a:p>
         </p:txBody>
@@ -7379,7 +8402,7 @@
     </p:spTree>
     <p:extLst>
       <p:ext uri="{BB962C8B-B14F-4D97-AF65-F5344CB8AC3E}">
-        <p14:creationId xmlns:p14="http://schemas.microsoft.com/office/powerpoint/2010/main" val="2969273431"/>
+        <p14:creationId xmlns:p14="http://schemas.microsoft.com/office/powerpoint/2010/main" val="2542312034"/>
       </p:ext>
     </p:extLst>
   </p:cSld>
@@ -7539,6 +8562,124 @@
 </p:sld>
 </file>
 
+<file path=ppt/slides/slide20.xml><?xml version="1.0" encoding="utf-8"?>
+<p:sld xmlns:a="http://schemas.openxmlformats.org/drawingml/2006/main" xmlns:r="http://schemas.openxmlformats.org/officeDocument/2006/relationships" xmlns:p="http://schemas.openxmlformats.org/presentationml/2006/main">
+  <p:cSld>
+    <p:spTree>
+      <p:nvGrpSpPr>
+        <p:cNvPr id="1" name=""/>
+        <p:cNvGrpSpPr/>
+        <p:nvPr/>
+      </p:nvGrpSpPr>
+      <p:grpSpPr>
+        <a:xfrm>
+          <a:off x="0" y="0"/>
+          <a:ext cx="0" cy="0"/>
+          <a:chOff x="0" y="0"/>
+          <a:chExt cx="0" cy="0"/>
+        </a:xfrm>
+      </p:grpSpPr>
+      <p:sp>
+        <p:nvSpPr>
+          <p:cNvPr id="5" name="Title 4"/>
+          <p:cNvSpPr>
+            <a:spLocks noGrp="1"/>
+          </p:cNvSpPr>
+          <p:nvPr>
+            <p:ph type="title"/>
+          </p:nvPr>
+        </p:nvSpPr>
+        <p:spPr/>
+        <p:txBody>
+          <a:bodyPr/>
+          <a:lstStyle/>
+          <a:p>
+            <a:r>
+              <a:rPr lang="en-US" dirty="0" smtClean="0"/>
+              <a:t>Thank you</a:t>
+            </a:r>
+            <a:endParaRPr lang="en-US" dirty="0"/>
+          </a:p>
+        </p:txBody>
+      </p:sp>
+      <p:sp>
+        <p:nvSpPr>
+          <p:cNvPr id="6" name="Text Placeholder 5"/>
+          <p:cNvSpPr>
+            <a:spLocks noGrp="1"/>
+          </p:cNvSpPr>
+          <p:nvPr>
+            <p:ph type="body" idx="1"/>
+          </p:nvPr>
+        </p:nvSpPr>
+        <p:spPr/>
+        <p:txBody>
+          <a:bodyPr/>
+          <a:lstStyle/>
+          <a:p>
+            <a:r>
+              <a:rPr lang="en-US" dirty="0" smtClean="0"/>
+              <a:t>EOF</a:t>
+            </a:r>
+            <a:endParaRPr lang="en-US" dirty="0"/>
+          </a:p>
+        </p:txBody>
+      </p:sp>
+      <p:sp>
+        <p:nvSpPr>
+          <p:cNvPr id="4" name="Slide Number Placeholder 3"/>
+          <p:cNvSpPr>
+            <a:spLocks noGrp="1"/>
+          </p:cNvSpPr>
+          <p:nvPr>
+            <p:ph type="sldNum" sz="quarter" idx="12"/>
+          </p:nvPr>
+        </p:nvSpPr>
+        <p:spPr/>
+        <p:txBody>
+          <a:bodyPr/>
+          <a:lstStyle/>
+          <a:p>
+            <a:fld id="{2A013F82-EE5E-44EE-A61D-E31C6657F26F}" type="slidenum">
+              <a:rPr lang="en-US" smtClean="0"/>
+              <a:t>20</a:t>
+            </a:fld>
+            <a:endParaRPr lang="en-US" dirty="0"/>
+          </a:p>
+        </p:txBody>
+      </p:sp>
+    </p:spTree>
+    <p:extLst>
+      <p:ext uri="{BB962C8B-B14F-4D97-AF65-F5344CB8AC3E}">
+        <p14:creationId xmlns:p14="http://schemas.microsoft.com/office/powerpoint/2010/main" val="2969273431"/>
+      </p:ext>
+    </p:extLst>
+  </p:cSld>
+  <p:clrMapOvr>
+    <a:masterClrMapping/>
+  </p:clrMapOvr>
+  <mc:AlternateContent xmlns:mc="http://schemas.openxmlformats.org/markup-compatibility/2006" xmlns:p14="http://schemas.microsoft.com/office/powerpoint/2010/main">
+    <mc:Choice Requires="p14">
+      <p:transition spd="med" p14:dur="700">
+        <p:fade/>
+      </p:transition>
+    </mc:Choice>
+    <mc:Fallback xmlns="">
+      <p:transition spd="med">
+        <p:fade/>
+      </p:transition>
+    </mc:Fallback>
+  </mc:AlternateContent>
+  <p:timing>
+    <p:tnLst>
+      <p:par>
+        <p:cTn id="1" dur="indefinite" restart="never" nodeType="tmRoot"/>
+      </p:par>
+    </p:tnLst>
+  </p:timing>
+</p:sld>
+</file>
+
 <file path=ppt/slides/slide3.xml><?xml version="1.0" encoding="utf-8"?>
 <p:sld xmlns:a="http://schemas.openxmlformats.org/drawingml/2006/main" xmlns:r="http://schemas.openxmlformats.org/officeDocument/2006/relationships" xmlns:p="http://schemas.openxmlformats.org/presentationml/2006/main">
   <p:cSld>
@@ -7752,7 +8893,9 @@
         </p:nvSpPr>
         <p:spPr/>
         <p:txBody>
-          <a:bodyPr/>
+          <a:bodyPr>
+            <a:normAutofit lnSpcReduction="10000"/>
+          </a:bodyPr>
           <a:lstStyle/>
           <a:p>
             <a:pPr lvl="0"/>
@@ -7765,39 +8908,62 @@
             <a:pPr lvl="0"/>
             <a:r>
               <a:rPr lang="en-US" dirty="0" smtClean="0"/>
-              <a:t>Creating a Repository</a:t>
-            </a:r>
+              <a:t>Working in an existing repository</a:t>
+            </a:r>
+            <a:endParaRPr lang="en-US" dirty="0" smtClean="0"/>
           </a:p>
           <a:p>
             <a:pPr lvl="0"/>
             <a:r>
               <a:rPr lang="en-US" dirty="0" smtClean="0"/>
-              <a:t>Create </a:t>
-            </a:r>
-          </a:p>
-          <a:p>
-            <a:r>
-              <a:rPr lang="en-US" dirty="0" smtClean="0"/>
-              <a:t>Issue Tracking</a:t>
-            </a:r>
-          </a:p>
-          <a:p>
-            <a:r>
-              <a:rPr lang="en-US" dirty="0" smtClean="0"/>
-              <a:t>Project Management Tools</a:t>
-            </a:r>
-          </a:p>
-          <a:p>
-            <a:r>
-              <a:rPr lang="en-US" dirty="0" smtClean="0"/>
-              <a:t>Creating a Wiki</a:t>
-            </a:r>
-          </a:p>
-          <a:p>
-            <a:r>
-              <a:rPr lang="en-US" dirty="0" smtClean="0"/>
-              <a:t>Other Tools</a:t>
-            </a:r>
+              <a:t>Using the project management tools</a:t>
+            </a:r>
+            <a:endParaRPr lang="en-US" dirty="0" smtClean="0"/>
+          </a:p>
+          <a:p>
+            <a:r>
+              <a:rPr lang="en-US" dirty="0" smtClean="0"/>
+              <a:t>Issue </a:t>
+            </a:r>
+            <a:r>
+              <a:rPr lang="en-US" dirty="0" smtClean="0"/>
+              <a:t>Tracking</a:t>
+            </a:r>
+            <a:endParaRPr lang="en-US" dirty="0" smtClean="0"/>
+          </a:p>
+          <a:p>
+            <a:r>
+              <a:rPr lang="en-US" dirty="0" smtClean="0"/>
+              <a:t>Creating a </a:t>
+            </a:r>
+            <a:r>
+              <a:rPr lang="en-US" dirty="0" smtClean="0"/>
+              <a:t>Wiki</a:t>
+            </a:r>
+          </a:p>
+          <a:p>
+            <a:r>
+              <a:rPr lang="en-US" dirty="0" smtClean="0"/>
+              <a:t>Creating a repository</a:t>
+            </a:r>
+            <a:endParaRPr lang="en-US" dirty="0" smtClean="0"/>
+          </a:p>
+          <a:p>
+            <a:r>
+              <a:rPr lang="en-US" dirty="0" smtClean="0"/>
+              <a:t>Other </a:t>
+            </a:r>
+            <a:r>
+              <a:rPr lang="en-US" dirty="0" smtClean="0"/>
+              <a:t>Tools</a:t>
+            </a:r>
+          </a:p>
+          <a:p>
+            <a:r>
+              <a:rPr lang="en-US" dirty="0" smtClean="0"/>
+              <a:t>Further resources</a:t>
+            </a:r>
+            <a:endParaRPr lang="en-US" dirty="0" smtClean="0"/>
           </a:p>
         </p:txBody>
       </p:sp>
@@ -9224,7 +10390,11 @@
             <a:pPr lvl="0"/>
             <a:r>
               <a:rPr lang="en-US" dirty="0" smtClean="0"/>
-              <a:t>Software examples include:</a:t>
+              <a:t>Version control software tools examples </a:t>
+            </a:r>
+            <a:r>
+              <a:rPr lang="en-US" dirty="0" smtClean="0"/>
+              <a:t>include:</a:t>
             </a:r>
           </a:p>
           <a:p>
@@ -9938,11 +11108,7 @@
           <a:p>
             <a:r>
               <a:rPr lang="en-US" dirty="0" smtClean="0"/>
-              <a:t>Repositories </a:t>
-            </a:r>
-            <a:r>
-              <a:rPr lang="en-US" dirty="0" smtClean="0"/>
-              <a:t>strength can be influenced by their weakest contributor</a:t>
+              <a:t>Repositories strength can be influenced by their weakest contributor</a:t>
             </a:r>
           </a:p>
           <a:p>
@@ -10687,18 +11853,410 @@
   <p:clrMapOvr>
     <a:masterClrMapping/>
   </p:clrMapOvr>
-  <mc:AlternateContent xmlns:mc="http://schemas.openxmlformats.org/markup-compatibility/2006" xmlns:p14="http://schemas.microsoft.com/office/powerpoint/2010/main">
-    <mc:Choice Requires="p14">
-      <p:transition p14:dur="0"/>
+  <mc:AlternateContent xmlns:mc="http://schemas.openxmlformats.org/markup-compatibility/2006">
+    <mc:Choice xmlns:p14="http://schemas.microsoft.com/office/powerpoint/2010/main" Requires="p14">
+      <p:transition p14:dur="10"/>
     </mc:Choice>
-    <mc:Fallback xmlns="">
+    <mc:Fallback>
       <p:transition/>
     </mc:Fallback>
   </mc:AlternateContent>
   <p:timing>
     <p:tnLst>
       <p:par>
-        <p:cTn id="1" dur="indefinite" restart="never" nodeType="tmRoot"/>
+        <p:cTn id="1" dur="indefinite" restart="never" nodeType="tmRoot">
+          <p:childTnLst>
+            <p:seq concurrent="1" nextAc="seek">
+              <p:cTn id="2" dur="indefinite" nodeType="mainSeq">
+                <p:childTnLst>
+                  <p:par>
+                    <p:cTn id="3" fill="hold">
+                      <p:stCondLst>
+                        <p:cond delay="indefinite"/>
+                      </p:stCondLst>
+                      <p:childTnLst>
+                        <p:par>
+                          <p:cTn id="4" fill="hold">
+                            <p:stCondLst>
+                              <p:cond delay="0"/>
+                            </p:stCondLst>
+                            <p:childTnLst>
+                              <p:par>
+                                <p:cTn id="5" presetID="1" presetClass="entr" presetSubtype="0" fill="hold" nodeType="clickEffect">
+                                  <p:stCondLst>
+                                    <p:cond delay="0"/>
+                                  </p:stCondLst>
+                                  <p:childTnLst>
+                                    <p:set>
+                                      <p:cBhvr>
+                                        <p:cTn id="6" dur="1" fill="hold">
+                                          <p:stCondLst>
+                                            <p:cond delay="0"/>
+                                          </p:stCondLst>
+                                        </p:cTn>
+                                        <p:tgtEl>
+                                          <p:spTgt spid="14">
+                                            <p:txEl>
+                                              <p:pRg st="0" end="0"/>
+                                            </p:txEl>
+                                          </p:spTgt>
+                                        </p:tgtEl>
+                                        <p:attrNameLst>
+                                          <p:attrName>style.visibility</p:attrName>
+                                        </p:attrNameLst>
+                                      </p:cBhvr>
+                                      <p:to>
+                                        <p:strVal val="visible"/>
+                                      </p:to>
+                                    </p:set>
+                                  </p:childTnLst>
+                                </p:cTn>
+                              </p:par>
+                            </p:childTnLst>
+                          </p:cTn>
+                        </p:par>
+                      </p:childTnLst>
+                    </p:cTn>
+                  </p:par>
+                  <p:par>
+                    <p:cTn id="7" fill="hold">
+                      <p:stCondLst>
+                        <p:cond delay="indefinite"/>
+                      </p:stCondLst>
+                      <p:childTnLst>
+                        <p:par>
+                          <p:cTn id="8" fill="hold">
+                            <p:stCondLst>
+                              <p:cond delay="0"/>
+                            </p:stCondLst>
+                            <p:childTnLst>
+                              <p:par>
+                                <p:cTn id="9" presetID="1" presetClass="entr" presetSubtype="0" fill="hold" nodeType="clickEffect">
+                                  <p:stCondLst>
+                                    <p:cond delay="0"/>
+                                  </p:stCondLst>
+                                  <p:childTnLst>
+                                    <p:set>
+                                      <p:cBhvr>
+                                        <p:cTn id="10" dur="1" fill="hold">
+                                          <p:stCondLst>
+                                            <p:cond delay="0"/>
+                                          </p:stCondLst>
+                                        </p:cTn>
+                                        <p:tgtEl>
+                                          <p:spTgt spid="14">
+                                            <p:txEl>
+                                              <p:pRg st="1" end="1"/>
+                                            </p:txEl>
+                                          </p:spTgt>
+                                        </p:tgtEl>
+                                        <p:attrNameLst>
+                                          <p:attrName>style.visibility</p:attrName>
+                                        </p:attrNameLst>
+                                      </p:cBhvr>
+                                      <p:to>
+                                        <p:strVal val="visible"/>
+                                      </p:to>
+                                    </p:set>
+                                  </p:childTnLst>
+                                </p:cTn>
+                              </p:par>
+                              <p:par>
+                                <p:cTn id="11" presetID="1" presetClass="entr" presetSubtype="0" fill="hold" nodeType="withEffect">
+                                  <p:stCondLst>
+                                    <p:cond delay="0"/>
+                                  </p:stCondLst>
+                                  <p:childTnLst>
+                                    <p:set>
+                                      <p:cBhvr>
+                                        <p:cTn id="12" dur="1" fill="hold">
+                                          <p:stCondLst>
+                                            <p:cond delay="0"/>
+                                          </p:stCondLst>
+                                        </p:cTn>
+                                        <p:tgtEl>
+                                          <p:spTgt spid="14">
+                                            <p:txEl>
+                                              <p:pRg st="2" end="2"/>
+                                            </p:txEl>
+                                          </p:spTgt>
+                                        </p:tgtEl>
+                                        <p:attrNameLst>
+                                          <p:attrName>style.visibility</p:attrName>
+                                        </p:attrNameLst>
+                                      </p:cBhvr>
+                                      <p:to>
+                                        <p:strVal val="visible"/>
+                                      </p:to>
+                                    </p:set>
+                                  </p:childTnLst>
+                                </p:cTn>
+                              </p:par>
+                              <p:par>
+                                <p:cTn id="13" presetID="1" presetClass="entr" presetSubtype="0" fill="hold" nodeType="withEffect">
+                                  <p:stCondLst>
+                                    <p:cond delay="0"/>
+                                  </p:stCondLst>
+                                  <p:childTnLst>
+                                    <p:set>
+                                      <p:cBhvr>
+                                        <p:cTn id="14" dur="1" fill="hold">
+                                          <p:stCondLst>
+                                            <p:cond delay="0"/>
+                                          </p:stCondLst>
+                                        </p:cTn>
+                                        <p:tgtEl>
+                                          <p:spTgt spid="14">
+                                            <p:txEl>
+                                              <p:pRg st="3" end="3"/>
+                                            </p:txEl>
+                                          </p:spTgt>
+                                        </p:tgtEl>
+                                        <p:attrNameLst>
+                                          <p:attrName>style.visibility</p:attrName>
+                                        </p:attrNameLst>
+                                      </p:cBhvr>
+                                      <p:to>
+                                        <p:strVal val="visible"/>
+                                      </p:to>
+                                    </p:set>
+                                  </p:childTnLst>
+                                </p:cTn>
+                              </p:par>
+                              <p:par>
+                                <p:cTn id="15" presetID="1" presetClass="entr" presetSubtype="0" fill="hold" nodeType="withEffect">
+                                  <p:stCondLst>
+                                    <p:cond delay="0"/>
+                                  </p:stCondLst>
+                                  <p:childTnLst>
+                                    <p:set>
+                                      <p:cBhvr>
+                                        <p:cTn id="16" dur="1" fill="hold">
+                                          <p:stCondLst>
+                                            <p:cond delay="0"/>
+                                          </p:stCondLst>
+                                        </p:cTn>
+                                        <p:tgtEl>
+                                          <p:spTgt spid="14">
+                                            <p:txEl>
+                                              <p:pRg st="4" end="4"/>
+                                            </p:txEl>
+                                          </p:spTgt>
+                                        </p:tgtEl>
+                                        <p:attrNameLst>
+                                          <p:attrName>style.visibility</p:attrName>
+                                        </p:attrNameLst>
+                                      </p:cBhvr>
+                                      <p:to>
+                                        <p:strVal val="visible"/>
+                                      </p:to>
+                                    </p:set>
+                                  </p:childTnLst>
+                                </p:cTn>
+                              </p:par>
+                              <p:par>
+                                <p:cTn id="17" presetID="1" presetClass="entr" presetSubtype="0" fill="hold" nodeType="withEffect">
+                                  <p:stCondLst>
+                                    <p:cond delay="0"/>
+                                  </p:stCondLst>
+                                  <p:childTnLst>
+                                    <p:set>
+                                      <p:cBhvr>
+                                        <p:cTn id="18" dur="1" fill="hold">
+                                          <p:stCondLst>
+                                            <p:cond delay="0"/>
+                                          </p:stCondLst>
+                                        </p:cTn>
+                                        <p:tgtEl>
+                                          <p:spTgt spid="14">
+                                            <p:txEl>
+                                              <p:pRg st="5" end="5"/>
+                                            </p:txEl>
+                                          </p:spTgt>
+                                        </p:tgtEl>
+                                        <p:attrNameLst>
+                                          <p:attrName>style.visibility</p:attrName>
+                                        </p:attrNameLst>
+                                      </p:cBhvr>
+                                      <p:to>
+                                        <p:strVal val="visible"/>
+                                      </p:to>
+                                    </p:set>
+                                  </p:childTnLst>
+                                </p:cTn>
+                              </p:par>
+                            </p:childTnLst>
+                          </p:cTn>
+                        </p:par>
+                      </p:childTnLst>
+                    </p:cTn>
+                  </p:par>
+                  <p:par>
+                    <p:cTn id="19" fill="hold">
+                      <p:stCondLst>
+                        <p:cond delay="indefinite"/>
+                      </p:stCondLst>
+                      <p:childTnLst>
+                        <p:par>
+                          <p:cTn id="20" fill="hold">
+                            <p:stCondLst>
+                              <p:cond delay="0"/>
+                            </p:stCondLst>
+                            <p:childTnLst>
+                              <p:par>
+                                <p:cTn id="21" presetID="1" presetClass="entr" presetSubtype="0" fill="hold" nodeType="clickEffect">
+                                  <p:stCondLst>
+                                    <p:cond delay="0"/>
+                                  </p:stCondLst>
+                                  <p:childTnLst>
+                                    <p:set>
+                                      <p:cBhvr>
+                                        <p:cTn id="22" dur="1" fill="hold">
+                                          <p:stCondLst>
+                                            <p:cond delay="0"/>
+                                          </p:stCondLst>
+                                        </p:cTn>
+                                        <p:tgtEl>
+                                          <p:spTgt spid="14">
+                                            <p:txEl>
+                                              <p:pRg st="6" end="6"/>
+                                            </p:txEl>
+                                          </p:spTgt>
+                                        </p:tgtEl>
+                                        <p:attrNameLst>
+                                          <p:attrName>style.visibility</p:attrName>
+                                        </p:attrNameLst>
+                                      </p:cBhvr>
+                                      <p:to>
+                                        <p:strVal val="visible"/>
+                                      </p:to>
+                                    </p:set>
+                                  </p:childTnLst>
+                                </p:cTn>
+                              </p:par>
+                            </p:childTnLst>
+                          </p:cTn>
+                        </p:par>
+                      </p:childTnLst>
+                    </p:cTn>
+                  </p:par>
+                  <p:par>
+                    <p:cTn id="23" fill="hold">
+                      <p:stCondLst>
+                        <p:cond delay="indefinite"/>
+                      </p:stCondLst>
+                      <p:childTnLst>
+                        <p:par>
+                          <p:cTn id="24" fill="hold">
+                            <p:stCondLst>
+                              <p:cond delay="0"/>
+                            </p:stCondLst>
+                            <p:childTnLst>
+                              <p:par>
+                                <p:cTn id="25" presetID="1" presetClass="entr" presetSubtype="0" fill="hold" nodeType="clickEffect">
+                                  <p:stCondLst>
+                                    <p:cond delay="0"/>
+                                  </p:stCondLst>
+                                  <p:childTnLst>
+                                    <p:set>
+                                      <p:cBhvr>
+                                        <p:cTn id="26" dur="1" fill="hold">
+                                          <p:stCondLst>
+                                            <p:cond delay="0"/>
+                                          </p:stCondLst>
+                                        </p:cTn>
+                                        <p:tgtEl>
+                                          <p:spTgt spid="14">
+                                            <p:txEl>
+                                              <p:pRg st="7" end="7"/>
+                                            </p:txEl>
+                                          </p:spTgt>
+                                        </p:tgtEl>
+                                        <p:attrNameLst>
+                                          <p:attrName>style.visibility</p:attrName>
+                                        </p:attrNameLst>
+                                      </p:cBhvr>
+                                      <p:to>
+                                        <p:strVal val="visible"/>
+                                      </p:to>
+                                    </p:set>
+                                  </p:childTnLst>
+                                </p:cTn>
+                              </p:par>
+                            </p:childTnLst>
+                          </p:cTn>
+                        </p:par>
+                      </p:childTnLst>
+                    </p:cTn>
+                  </p:par>
+                  <p:par>
+                    <p:cTn id="27" fill="hold">
+                      <p:stCondLst>
+                        <p:cond delay="indefinite"/>
+                      </p:stCondLst>
+                      <p:childTnLst>
+                        <p:par>
+                          <p:cTn id="28" fill="hold">
+                            <p:stCondLst>
+                              <p:cond delay="0"/>
+                            </p:stCondLst>
+                            <p:childTnLst>
+                              <p:par>
+                                <p:cTn id="29" presetID="1" presetClass="entr" presetSubtype="0" fill="hold" nodeType="clickEffect">
+                                  <p:stCondLst>
+                                    <p:cond delay="0"/>
+                                  </p:stCondLst>
+                                  <p:childTnLst>
+                                    <p:set>
+                                      <p:cBhvr>
+                                        <p:cTn id="30" dur="1" fill="hold">
+                                          <p:stCondLst>
+                                            <p:cond delay="0"/>
+                                          </p:stCondLst>
+                                        </p:cTn>
+                                        <p:tgtEl>
+                                          <p:spTgt spid="14">
+                                            <p:txEl>
+                                              <p:pRg st="8" end="8"/>
+                                            </p:txEl>
+                                          </p:spTgt>
+                                        </p:tgtEl>
+                                        <p:attrNameLst>
+                                          <p:attrName>style.visibility</p:attrName>
+                                        </p:attrNameLst>
+                                      </p:cBhvr>
+                                      <p:to>
+                                        <p:strVal val="visible"/>
+                                      </p:to>
+                                    </p:set>
+                                  </p:childTnLst>
+                                </p:cTn>
+                              </p:par>
+                            </p:childTnLst>
+                          </p:cTn>
+                        </p:par>
+                      </p:childTnLst>
+                    </p:cTn>
+                  </p:par>
+                </p:childTnLst>
+              </p:cTn>
+              <p:prevCondLst>
+                <p:cond evt="onPrev" delay="0">
+                  <p:tgtEl>
+                    <p:sldTgt/>
+                  </p:tgtEl>
+                </p:cond>
+              </p:prevCondLst>
+              <p:nextCondLst>
+                <p:cond evt="onNext" delay="0">
+                  <p:tgtEl>
+                    <p:sldTgt/>
+                  </p:tgtEl>
+                </p:cond>
+              </p:nextCondLst>
+            </p:seq>
+          </p:childTnLst>
+        </p:cTn>
       </p:par>
     </p:tnLst>
   </p:timing>
@@ -11556,15 +13114,6 @@
 </file>
 
 <file path=customXml/item1.xml><?xml version="1.0" encoding="utf-8"?>
-<?mso-contentType ?>
-<FormTemplates xmlns="http://schemas.microsoft.com/sharepoint/v3/contenttype/forms">
-  <Display>DocumentLibraryForm</Display>
-  <Edit>DocumentLibraryForm</Edit>
-  <New>DocumentLibraryForm</New>
-</FormTemplates>
-</file>
-
-<file path=customXml/item2.xml><?xml version="1.0" encoding="utf-8"?>
 <p:properties xmlns:p="http://schemas.microsoft.com/office/2006/metadata/properties" xmlns:xsi="http://www.w3.org/2001/XMLSchema-instance" xmlns:pc="http://schemas.microsoft.com/office/infopath/2007/PartnerControls">
   <documentManagement>
     <VSO_x0020_item_x0020_id xmlns="40262f94-9f35-4ac3-9a90-690165a166b7" xsi:nil="true"/>
@@ -11573,6 +13122,15 @@
     <Template_x0020_details xmlns="40262f94-9f35-4ac3-9a90-690165a166b7" xsi:nil="true"/>
   </documentManagement>
 </p:properties>
+</file>
+
+<file path=customXml/item2.xml><?xml version="1.0" encoding="utf-8"?>
+<?mso-contentType ?>
+<FormTemplates xmlns="http://schemas.microsoft.com/sharepoint/v3/contenttype/forms">
+  <Display>DocumentLibraryForm</Display>
+  <Edit>DocumentLibraryForm</Edit>
+  <New>DocumentLibraryForm</New>
+</FormTemplates>
 </file>
 
 <file path=customXml/item3.xml><?xml version="1.0" encoding="utf-8"?>
@@ -11757,26 +13315,26 @@
 </file>
 
 <file path=customXml/itemProps1.xml><?xml version="1.0" encoding="utf-8"?>
-<ds:datastoreItem xmlns:ds="http://schemas.openxmlformats.org/officeDocument/2006/customXml" ds:itemID="{0875BD71-4A33-4FB7-88CA-777C4D9E6EE5}">
+<ds:datastoreItem xmlns:ds="http://schemas.openxmlformats.org/officeDocument/2006/customXml" ds:itemID="{3049C11C-71DC-49B6-ACD8-27E3AE088D14}">
   <ds:schemaRefs>
-    <ds:schemaRef ds:uri="http://schemas.microsoft.com/sharepoint/v3/contenttype/forms"/>
+    <ds:schemaRef ds:uri="http://purl.org/dc/dcmitype/"/>
+    <ds:schemaRef ds:uri="a4f35948-e619-41b3-aa29-22878b09cfd2"/>
+    <ds:schemaRef ds:uri="http://purl.org/dc/terms/"/>
+    <ds:schemaRef ds:uri="http://schemas.openxmlformats.org/package/2006/metadata/core-properties"/>
+    <ds:schemaRef ds:uri="http://schemas.microsoft.com/office/2006/documentManagement/types"/>
+    <ds:schemaRef ds:uri="http://www.w3.org/XML/1998/namespace"/>
+    <ds:schemaRef ds:uri="http://purl.org/dc/elements/1.1/"/>
+    <ds:schemaRef ds:uri="http://schemas.microsoft.com/office/infopath/2007/PartnerControls"/>
+    <ds:schemaRef ds:uri="40262f94-9f35-4ac3-9a90-690165a166b7"/>
+    <ds:schemaRef ds:uri="http://schemas.microsoft.com/office/2006/metadata/properties"/>
   </ds:schemaRefs>
 </ds:datastoreItem>
 </file>
 
 <file path=customXml/itemProps2.xml><?xml version="1.0" encoding="utf-8"?>
-<ds:datastoreItem xmlns:ds="http://schemas.openxmlformats.org/officeDocument/2006/customXml" ds:itemID="{3049C11C-71DC-49B6-ACD8-27E3AE088D14}">
+<ds:datastoreItem xmlns:ds="http://schemas.openxmlformats.org/officeDocument/2006/customXml" ds:itemID="{0875BD71-4A33-4FB7-88CA-777C4D9E6EE5}">
   <ds:schemaRefs>
-    <ds:schemaRef ds:uri="http://purl.org/dc/terms/"/>
-    <ds:schemaRef ds:uri="a4f35948-e619-41b3-aa29-22878b09cfd2"/>
-    <ds:schemaRef ds:uri="http://schemas.microsoft.com/office/2006/documentManagement/types"/>
-    <ds:schemaRef ds:uri="http://schemas.microsoft.com/office/infopath/2007/PartnerControls"/>
-    <ds:schemaRef ds:uri="http://schemas.openxmlformats.org/package/2006/metadata/core-properties"/>
-    <ds:schemaRef ds:uri="http://purl.org/dc/elements/1.1/"/>
-    <ds:schemaRef ds:uri="40262f94-9f35-4ac3-9a90-690165a166b7"/>
-    <ds:schemaRef ds:uri="http://schemas.microsoft.com/office/2006/metadata/properties"/>
-    <ds:schemaRef ds:uri="http://www.w3.org/XML/1998/namespace"/>
-    <ds:schemaRef ds:uri="http://purl.org/dc/dcmitype/"/>
+    <ds:schemaRef ds:uri="http://schemas.microsoft.com/sharepoint/v3/contenttype/forms"/>
   </ds:schemaRefs>
 </ds:datastoreItem>
 </file>

</xml_diff>